<commit_message>
add a slide about the AI researcher's salary to 01_school_of_ai
</commit_message>
<xml_diff>
--- a/slides/meetup_01/01_school_of_ai.pptx
+++ b/slides/meetup_01/01_school_of_ai.pptx
@@ -16,16 +16,17 @@
     <p:sldId id="261" r:id="rId11"/>
     <p:sldId id="262" r:id="rId12"/>
     <p:sldId id="263" r:id="rId13"/>
+    <p:sldId id="264" r:id="rId14"/>
   </p:sldIdLst>
   <p:sldSz cy="5143500" cx="9144000"/>
   <p:notesSz cx="6858000" cy="9144000"/>
   <p:embeddedFontLst>
     <p:embeddedFont>
       <p:font typeface="Roboto"/>
-      <p:regular r:id="rId14"/>
-      <p:bold r:id="rId15"/>
-      <p:italic r:id="rId16"/>
-      <p:boldItalic r:id="rId17"/>
+      <p:regular r:id="rId15"/>
+      <p:bold r:id="rId16"/>
+      <p:italic r:id="rId17"/>
+      <p:boldItalic r:id="rId18"/>
     </p:embeddedFont>
   </p:embeddedFontLst>
   <p:defaultTextStyle>
@@ -917,7 +918,7 @@
       </p:grpSpPr>
       <p:sp>
         <p:nvSpPr>
-          <p:cNvPr id="76" name="Google Shape;76;gc6f73a04f_0_20:notes"/>
+          <p:cNvPr id="76" name="Google Shape;76;gc6f73a04f_0_5:notes"/>
           <p:cNvSpPr/>
           <p:nvPr>
             <p:ph idx="2" type="sldImg"/>
@@ -952,7 +953,7 @@
       </p:sp>
       <p:sp>
         <p:nvSpPr>
-          <p:cNvPr id="77" name="Google Shape;77;gc6f73a04f_0_20:notes"/>
+          <p:cNvPr id="77" name="Google Shape;77;gc6f73a04f_0_5:notes"/>
           <p:cNvSpPr txBox="1"/>
           <p:nvPr>
             <p:ph idx="1" type="body"/>
@@ -1002,7 +1003,7 @@
   <p:cSld>
     <p:spTree>
       <p:nvGrpSpPr>
-        <p:cNvPr id="86" name="Shape 86"/>
+        <p:cNvPr id="80" name="Shape 80"/>
         <p:cNvGrpSpPr/>
         <p:nvPr/>
       </p:nvGrpSpPr>
@@ -1016,7 +1017,7 @@
       </p:grpSpPr>
       <p:sp>
         <p:nvSpPr>
-          <p:cNvPr id="87" name="Google Shape;87;g41d2583503_0_83:notes"/>
+          <p:cNvPr id="81" name="Google Shape;81;gc6f73a04f_0_20:notes"/>
           <p:cNvSpPr/>
           <p:nvPr>
             <p:ph idx="2" type="sldImg"/>
@@ -1051,7 +1052,7 @@
       </p:sp>
       <p:sp>
         <p:nvSpPr>
-          <p:cNvPr id="88" name="Google Shape;88;g41d2583503_0_83:notes"/>
+          <p:cNvPr id="82" name="Google Shape;82;gc6f73a04f_0_20:notes"/>
           <p:cNvSpPr txBox="1"/>
           <p:nvPr>
             <p:ph idx="1" type="body"/>
@@ -1101,7 +1102,7 @@
   <p:cSld>
     <p:spTree>
       <p:nvGrpSpPr>
-        <p:cNvPr id="94" name="Shape 94"/>
+        <p:cNvPr id="91" name="Shape 91"/>
         <p:cNvGrpSpPr/>
         <p:nvPr/>
       </p:nvGrpSpPr>
@@ -1115,7 +1116,7 @@
       </p:grpSpPr>
       <p:sp>
         <p:nvSpPr>
-          <p:cNvPr id="95" name="Google Shape;95;g41d2583503_0_98:notes"/>
+          <p:cNvPr id="92" name="Google Shape;92;g41d2583503_0_83:notes"/>
           <p:cNvSpPr/>
           <p:nvPr>
             <p:ph idx="2" type="sldImg"/>
@@ -1150,7 +1151,7 @@
       </p:sp>
       <p:sp>
         <p:nvSpPr>
-          <p:cNvPr id="96" name="Google Shape;96;g41d2583503_0_98:notes"/>
+          <p:cNvPr id="93" name="Google Shape;93;g41d2583503_0_83:notes"/>
           <p:cNvSpPr txBox="1"/>
           <p:nvPr>
             <p:ph idx="1" type="body"/>
@@ -1200,7 +1201,7 @@
   <p:cSld>
     <p:spTree>
       <p:nvGrpSpPr>
-        <p:cNvPr id="102" name="Shape 102"/>
+        <p:cNvPr id="99" name="Shape 99"/>
         <p:cNvGrpSpPr/>
         <p:nvPr/>
       </p:nvGrpSpPr>
@@ -1214,7 +1215,7 @@
       </p:grpSpPr>
       <p:sp>
         <p:nvSpPr>
-          <p:cNvPr id="103" name="Google Shape;103;g41d2583503_0_158:notes"/>
+          <p:cNvPr id="100" name="Google Shape;100;g41d2583503_0_98:notes"/>
           <p:cNvSpPr/>
           <p:nvPr>
             <p:ph idx="2" type="sldImg"/>
@@ -1249,7 +1250,7 @@
       </p:sp>
       <p:sp>
         <p:nvSpPr>
-          <p:cNvPr id="104" name="Google Shape;104;g41d2583503_0_158:notes"/>
+          <p:cNvPr id="101" name="Google Shape;101;g41d2583503_0_98:notes"/>
           <p:cNvSpPr txBox="1"/>
           <p:nvPr>
             <p:ph idx="1" type="body"/>
@@ -1299,7 +1300,7 @@
   <p:cSld>
     <p:spTree>
       <p:nvGrpSpPr>
-        <p:cNvPr id="121" name="Shape 121"/>
+        <p:cNvPr id="107" name="Shape 107"/>
         <p:cNvGrpSpPr/>
         <p:nvPr/>
       </p:nvGrpSpPr>
@@ -1313,7 +1314,7 @@
       </p:grpSpPr>
       <p:sp>
         <p:nvSpPr>
-          <p:cNvPr id="122" name="Google Shape;122;gc6f73a04f_0_9:notes"/>
+          <p:cNvPr id="108" name="Google Shape;108;g41d2583503_0_158:notes"/>
           <p:cNvSpPr/>
           <p:nvPr>
             <p:ph idx="2" type="sldImg"/>
@@ -1348,7 +1349,7 @@
       </p:sp>
       <p:sp>
         <p:nvSpPr>
-          <p:cNvPr id="123" name="Google Shape;123;gc6f73a04f_0_9:notes"/>
+          <p:cNvPr id="109" name="Google Shape;109;g41d2583503_0_158:notes"/>
           <p:cNvSpPr txBox="1"/>
           <p:nvPr>
             <p:ph idx="1" type="body"/>
@@ -1398,7 +1399,7 @@
   <p:cSld>
     <p:spTree>
       <p:nvGrpSpPr>
-        <p:cNvPr id="127" name="Shape 127"/>
+        <p:cNvPr id="126" name="Shape 126"/>
         <p:cNvGrpSpPr/>
         <p:nvPr/>
       </p:nvGrpSpPr>
@@ -1412,7 +1413,7 @@
       </p:grpSpPr>
       <p:sp>
         <p:nvSpPr>
-          <p:cNvPr id="128" name="Google Shape;128;gc6f73a04f_0_5:notes"/>
+          <p:cNvPr id="127" name="Google Shape;127;gc6f73a04f_0_9:notes"/>
           <p:cNvSpPr/>
           <p:nvPr>
             <p:ph idx="2" type="sldImg"/>
@@ -1447,7 +1448,106 @@
       </p:sp>
       <p:sp>
         <p:nvSpPr>
-          <p:cNvPr id="129" name="Google Shape;129;gc6f73a04f_0_5:notes"/>
+          <p:cNvPr id="128" name="Google Shape;128;gc6f73a04f_0_9:notes"/>
+          <p:cNvSpPr txBox="1"/>
+          <p:nvPr>
+            <p:ph idx="1" type="body"/>
+          </p:nvPr>
+        </p:nvSpPr>
+        <p:spPr>
+          <a:xfrm>
+            <a:off x="685800" y="4343400"/>
+            <a:ext cx="5486400" cy="4114800"/>
+          </a:xfrm>
+          <a:prstGeom prst="rect">
+            <a:avLst/>
+          </a:prstGeom>
+        </p:spPr>
+        <p:txBody>
+          <a:bodyPr anchorCtr="0" anchor="t" bIns="91425" lIns="91425" spcFirstLastPara="1" rIns="91425" wrap="square" tIns="91425">
+            <a:noAutofit/>
+          </a:bodyPr>
+          <a:lstStyle/>
+          <a:p>
+            <a:pPr indent="0" lvl="0" marL="0" rtl="0" algn="l">
+              <a:spcBef>
+                <a:spcPts val="0"/>
+              </a:spcBef>
+              <a:spcAft>
+                <a:spcPts val="0"/>
+              </a:spcAft>
+              <a:buNone/>
+            </a:pPr>
+            <a:r>
+              <a:t/>
+            </a:r>
+            <a:endParaRPr/>
+          </a:p>
+        </p:txBody>
+      </p:sp>
+    </p:spTree>
+  </p:cSld>
+  <p:clrMapOvr>
+    <a:masterClrMapping/>
+  </p:clrMapOvr>
+</p:notes>
+</file>
+
+<file path=ppt/notesSlides/notesSlide9.xml><?xml version="1.0" encoding="utf-8"?>
+<p:notes xmlns:a="http://schemas.openxmlformats.org/drawingml/2006/main" xmlns:r="http://schemas.openxmlformats.org/officeDocument/2006/relationships" xmlns:mc="http://schemas.openxmlformats.org/markup-compatibility/2006" xmlns:mv="urn:schemas-microsoft-com:mac:vml" xmlns:p="http://schemas.openxmlformats.org/presentationml/2006/main" xmlns:c="http://schemas.openxmlformats.org/drawingml/2006/chart" xmlns:dgm="http://schemas.openxmlformats.org/drawingml/2006/diagram" xmlns:o="urn:schemas-microsoft-com:office:office" xmlns:v="urn:schemas-microsoft-com:vml" xmlns:pvml="urn:schemas-microsoft-com:office:powerpoint" xmlns:com="http://schemas.openxmlformats.org/drawingml/2006/compatibility" xmlns:p14="http://schemas.microsoft.com/office/powerpoint/2010/main" xmlns:p15="http://schemas.microsoft.com/office/powerpoint/2012/main" showMasterPhAnim="0" showMasterSp="0">
+  <p:cSld>
+    <p:spTree>
+      <p:nvGrpSpPr>
+        <p:cNvPr id="132" name="Shape 132"/>
+        <p:cNvGrpSpPr/>
+        <p:nvPr/>
+      </p:nvGrpSpPr>
+      <p:grpSpPr>
+        <a:xfrm>
+          <a:off x="0" y="0"/>
+          <a:ext cx="0" cy="0"/>
+          <a:chOff x="0" y="0"/>
+          <a:chExt cx="0" cy="0"/>
+        </a:xfrm>
+      </p:grpSpPr>
+      <p:sp>
+        <p:nvSpPr>
+          <p:cNvPr id="133" name="Google Shape;133;g3f3c3dcedb_0_10:notes"/>
+          <p:cNvSpPr/>
+          <p:nvPr>
+            <p:ph idx="2" type="sldImg"/>
+          </p:nvPr>
+        </p:nvSpPr>
+        <p:spPr>
+          <a:xfrm>
+            <a:off x="381188" y="685800"/>
+            <a:ext cx="6096300" cy="3429000"/>
+          </a:xfrm>
+          <a:custGeom>
+            <a:rect b="b" l="l" r="r" t="t"/>
+            <a:pathLst>
+              <a:path extrusionOk="0" h="120000" w="120000">
+                <a:moveTo>
+                  <a:pt x="0" y="0"/>
+                </a:moveTo>
+                <a:lnTo>
+                  <a:pt x="120000" y="0"/>
+                </a:lnTo>
+                <a:lnTo>
+                  <a:pt x="120000" y="120000"/>
+                </a:lnTo>
+                <a:lnTo>
+                  <a:pt x="0" y="120000"/>
+                </a:lnTo>
+                <a:close/>
+              </a:path>
+            </a:pathLst>
+          </a:custGeom>
+        </p:spPr>
+      </p:sp>
+      <p:sp>
+        <p:nvSpPr>
+          <p:cNvPr id="134" name="Google Shape;134;g3f3c3dcedb_0_10:notes"/>
           <p:cNvSpPr txBox="1"/>
           <p:nvPr>
             <p:ph idx="1" type="body"/>
@@ -7557,9 +7657,62 @@
           <a:chExt cx="0" cy="0"/>
         </a:xfrm>
       </p:grpSpPr>
+      <p:pic>
+        <p:nvPicPr>
+          <p:cNvPr id="79" name="Google Shape;79;p15"/>
+          <p:cNvPicPr preferRelativeResize="0"/>
+          <p:nvPr/>
+        </p:nvPicPr>
+        <p:blipFill>
+          <a:blip r:embed="rId3">
+            <a:alphaModFix/>
+          </a:blip>
+          <a:stretch>
+            <a:fillRect/>
+          </a:stretch>
+        </p:blipFill>
+        <p:spPr>
+          <a:xfrm rot="1185848">
+            <a:off x="427242" y="1444956"/>
+            <a:ext cx="8289515" cy="2253589"/>
+          </a:xfrm>
+          <a:prstGeom prst="rect">
+            <a:avLst/>
+          </a:prstGeom>
+          <a:noFill/>
+          <a:ln>
+            <a:noFill/>
+          </a:ln>
+        </p:spPr>
+      </p:pic>
+    </p:spTree>
+  </p:cSld>
+  <p:clrMapOvr>
+    <a:masterClrMapping/>
+  </p:clrMapOvr>
+</p:sld>
+</file>
+
+<file path=ppt/slides/slide4.xml><?xml version="1.0" encoding="utf-8"?>
+<p:sld xmlns:a="http://schemas.openxmlformats.org/drawingml/2006/main" xmlns:r="http://schemas.openxmlformats.org/officeDocument/2006/relationships" xmlns:mc="http://schemas.openxmlformats.org/markup-compatibility/2006" xmlns:mv="urn:schemas-microsoft-com:mac:vml" xmlns:p="http://schemas.openxmlformats.org/presentationml/2006/main" xmlns:c="http://schemas.openxmlformats.org/drawingml/2006/chart" xmlns:dgm="http://schemas.openxmlformats.org/drawingml/2006/diagram" xmlns:o="urn:schemas-microsoft-com:office:office" xmlns:v="urn:schemas-microsoft-com:vml" xmlns:pvml="urn:schemas-microsoft-com:office:powerpoint" xmlns:com="http://schemas.openxmlformats.org/drawingml/2006/compatibility" xmlns:p14="http://schemas.microsoft.com/office/powerpoint/2010/main" xmlns:p15="http://schemas.microsoft.com/office/powerpoint/2012/main">
+  <p:cSld>
+    <p:spTree>
+      <p:nvGrpSpPr>
+        <p:cNvPr id="83" name="Shape 83"/>
+        <p:cNvGrpSpPr/>
+        <p:nvPr/>
+      </p:nvGrpSpPr>
+      <p:grpSpPr>
+        <a:xfrm>
+          <a:off x="0" y="0"/>
+          <a:ext cx="0" cy="0"/>
+          <a:chOff x="0" y="0"/>
+          <a:chExt cx="0" cy="0"/>
+        </a:xfrm>
+      </p:grpSpPr>
       <p:sp>
         <p:nvSpPr>
-          <p:cNvPr id="79" name="Google Shape;79;p15"/>
+          <p:cNvPr id="84" name="Google Shape;84;p16"/>
           <p:cNvSpPr txBox="1"/>
           <p:nvPr>
             <p:ph type="title"/>
@@ -7599,7 +7752,7 @@
       </p:sp>
       <p:sp>
         <p:nvSpPr>
-          <p:cNvPr id="80" name="Google Shape;80;p15"/>
+          <p:cNvPr id="85" name="Google Shape;85;p16"/>
           <p:cNvSpPr txBox="1"/>
           <p:nvPr>
             <p:ph idx="1" type="body"/>
@@ -7686,7 +7839,7 @@
       </p:sp>
       <p:pic>
         <p:nvPicPr>
-          <p:cNvPr id="81" name="Google Shape;81;p15"/>
+          <p:cNvPr id="86" name="Google Shape;86;p16"/>
           <p:cNvPicPr preferRelativeResize="0"/>
           <p:nvPr/>
         </p:nvPicPr>
@@ -7714,7 +7867,7 @@
       </p:pic>
       <p:sp>
         <p:nvSpPr>
-          <p:cNvPr id="82" name="Google Shape;82;p15"/>
+          <p:cNvPr id="87" name="Google Shape;87;p16"/>
           <p:cNvSpPr txBox="1"/>
           <p:nvPr/>
         </p:nvSpPr>
@@ -7756,7 +7909,7 @@
       </p:sp>
       <p:pic>
         <p:nvPicPr>
-          <p:cNvPr id="83" name="Google Shape;83;p15"/>
+          <p:cNvPr id="88" name="Google Shape;88;p16"/>
           <p:cNvPicPr preferRelativeResize="0"/>
           <p:nvPr/>
         </p:nvPicPr>
@@ -7784,7 +7937,7 @@
       </p:pic>
       <p:pic>
         <p:nvPicPr>
-          <p:cNvPr id="84" name="Google Shape;84;p15"/>
+          <p:cNvPr id="89" name="Google Shape;89;p16"/>
           <p:cNvPicPr preferRelativeResize="0"/>
           <p:nvPr/>
         </p:nvPicPr>
@@ -7812,7 +7965,7 @@
       </p:pic>
       <p:sp>
         <p:nvSpPr>
-          <p:cNvPr id="85" name="Google Shape;85;p15"/>
+          <p:cNvPr id="90" name="Google Shape;90;p16"/>
           <p:cNvSpPr txBox="1"/>
           <p:nvPr/>
         </p:nvSpPr>
@@ -7860,12 +8013,12 @@
 </p:sld>
 </file>
 
-<file path=ppt/slides/slide4.xml><?xml version="1.0" encoding="utf-8"?>
+<file path=ppt/slides/slide5.xml><?xml version="1.0" encoding="utf-8"?>
 <p:sld xmlns:a="http://schemas.openxmlformats.org/drawingml/2006/main" xmlns:r="http://schemas.openxmlformats.org/officeDocument/2006/relationships" xmlns:mc="http://schemas.openxmlformats.org/markup-compatibility/2006" xmlns:mv="urn:schemas-microsoft-com:mac:vml" xmlns:p="http://schemas.openxmlformats.org/presentationml/2006/main" xmlns:c="http://schemas.openxmlformats.org/drawingml/2006/chart" xmlns:dgm="http://schemas.openxmlformats.org/drawingml/2006/diagram" xmlns:o="urn:schemas-microsoft-com:office:office" xmlns:v="urn:schemas-microsoft-com:vml" xmlns:pvml="urn:schemas-microsoft-com:office:powerpoint" xmlns:com="http://schemas.openxmlformats.org/drawingml/2006/compatibility" xmlns:p14="http://schemas.microsoft.com/office/powerpoint/2010/main" xmlns:p15="http://schemas.microsoft.com/office/powerpoint/2012/main">
   <p:cSld>
     <p:spTree>
       <p:nvGrpSpPr>
-        <p:cNvPr id="89" name="Shape 89"/>
+        <p:cNvPr id="94" name="Shape 94"/>
         <p:cNvGrpSpPr/>
         <p:nvPr/>
       </p:nvGrpSpPr>
@@ -7879,7 +8032,7 @@
       </p:grpSpPr>
       <p:sp>
         <p:nvSpPr>
-          <p:cNvPr id="90" name="Google Shape;90;p16"/>
+          <p:cNvPr id="95" name="Google Shape;95;p17"/>
           <p:cNvSpPr txBox="1"/>
           <p:nvPr>
             <p:ph type="title"/>
@@ -7919,7 +8072,7 @@
       </p:sp>
       <p:sp>
         <p:nvSpPr>
-          <p:cNvPr id="91" name="Google Shape;91;p16"/>
+          <p:cNvPr id="96" name="Google Shape;96;p17"/>
           <p:cNvSpPr txBox="1"/>
           <p:nvPr>
             <p:ph idx="1" type="body"/>
@@ -8005,7 +8158,7 @@
       </p:sp>
       <p:pic>
         <p:nvPicPr>
-          <p:cNvPr id="92" name="Google Shape;92;p16"/>
+          <p:cNvPr id="97" name="Google Shape;97;p17"/>
           <p:cNvPicPr preferRelativeResize="0"/>
           <p:nvPr/>
         </p:nvPicPr>
@@ -8033,7 +8186,7 @@
       </p:pic>
       <p:sp>
         <p:nvSpPr>
-          <p:cNvPr id="93" name="Google Shape;93;p16"/>
+          <p:cNvPr id="98" name="Google Shape;98;p17"/>
           <p:cNvSpPr txBox="1"/>
           <p:nvPr/>
         </p:nvSpPr>
@@ -8081,12 +8234,12 @@
 </p:sld>
 </file>
 
-<file path=ppt/slides/slide5.xml><?xml version="1.0" encoding="utf-8"?>
+<file path=ppt/slides/slide6.xml><?xml version="1.0" encoding="utf-8"?>
 <p:sld xmlns:a="http://schemas.openxmlformats.org/drawingml/2006/main" xmlns:r="http://schemas.openxmlformats.org/officeDocument/2006/relationships" xmlns:mc="http://schemas.openxmlformats.org/markup-compatibility/2006" xmlns:mv="urn:schemas-microsoft-com:mac:vml" xmlns:p="http://schemas.openxmlformats.org/presentationml/2006/main" xmlns:c="http://schemas.openxmlformats.org/drawingml/2006/chart" xmlns:dgm="http://schemas.openxmlformats.org/drawingml/2006/diagram" xmlns:o="urn:schemas-microsoft-com:office:office" xmlns:v="urn:schemas-microsoft-com:vml" xmlns:pvml="urn:schemas-microsoft-com:office:powerpoint" xmlns:com="http://schemas.openxmlformats.org/drawingml/2006/compatibility" xmlns:p14="http://schemas.microsoft.com/office/powerpoint/2010/main" xmlns:p15="http://schemas.microsoft.com/office/powerpoint/2012/main">
   <p:cSld>
     <p:spTree>
       <p:nvGrpSpPr>
-        <p:cNvPr id="97" name="Shape 97"/>
+        <p:cNvPr id="102" name="Shape 102"/>
         <p:cNvGrpSpPr/>
         <p:nvPr/>
       </p:nvGrpSpPr>
@@ -8100,7 +8253,7 @@
       </p:grpSpPr>
       <p:sp>
         <p:nvSpPr>
-          <p:cNvPr id="98" name="Google Shape;98;p17"/>
+          <p:cNvPr id="103" name="Google Shape;103;p18"/>
           <p:cNvSpPr txBox="1"/>
           <p:nvPr>
             <p:ph type="title"/>
@@ -8140,7 +8293,7 @@
       </p:sp>
       <p:sp>
         <p:nvSpPr>
-          <p:cNvPr id="99" name="Google Shape;99;p17"/>
+          <p:cNvPr id="104" name="Google Shape;104;p18"/>
           <p:cNvSpPr txBox="1"/>
           <p:nvPr>
             <p:ph idx="1" type="body"/>
@@ -8241,7 +8394,7 @@
       </p:sp>
       <p:pic>
         <p:nvPicPr>
-          <p:cNvPr id="100" name="Google Shape;100;p17"/>
+          <p:cNvPr id="105" name="Google Shape;105;p18"/>
           <p:cNvPicPr preferRelativeResize="0"/>
           <p:nvPr/>
         </p:nvPicPr>
@@ -8269,7 +8422,7 @@
       </p:pic>
       <p:pic>
         <p:nvPicPr>
-          <p:cNvPr id="101" name="Google Shape;101;p17"/>
+          <p:cNvPr id="106" name="Google Shape;106;p18"/>
           <p:cNvPicPr preferRelativeResize="0"/>
           <p:nvPr/>
         </p:nvPicPr>
@@ -8303,12 +8456,12 @@
 </p:sld>
 </file>
 
-<file path=ppt/slides/slide6.xml><?xml version="1.0" encoding="utf-8"?>
+<file path=ppt/slides/slide7.xml><?xml version="1.0" encoding="utf-8"?>
 <p:sld xmlns:a="http://schemas.openxmlformats.org/drawingml/2006/main" xmlns:r="http://schemas.openxmlformats.org/officeDocument/2006/relationships" xmlns:mc="http://schemas.openxmlformats.org/markup-compatibility/2006" xmlns:mv="urn:schemas-microsoft-com:mac:vml" xmlns:p="http://schemas.openxmlformats.org/presentationml/2006/main" xmlns:c="http://schemas.openxmlformats.org/drawingml/2006/chart" xmlns:dgm="http://schemas.openxmlformats.org/drawingml/2006/diagram" xmlns:o="urn:schemas-microsoft-com:office:office" xmlns:v="urn:schemas-microsoft-com:vml" xmlns:pvml="urn:schemas-microsoft-com:office:powerpoint" xmlns:com="http://schemas.openxmlformats.org/drawingml/2006/compatibility" xmlns:p14="http://schemas.microsoft.com/office/powerpoint/2010/main" xmlns:p15="http://schemas.microsoft.com/office/powerpoint/2012/main">
   <p:cSld>
     <p:spTree>
       <p:nvGrpSpPr>
-        <p:cNvPr id="105" name="Shape 105"/>
+        <p:cNvPr id="110" name="Shape 110"/>
         <p:cNvGrpSpPr/>
         <p:nvPr/>
       </p:nvGrpSpPr>
@@ -8322,7 +8475,7 @@
       </p:grpSpPr>
       <p:sp>
         <p:nvSpPr>
-          <p:cNvPr id="106" name="Google Shape;106;p18"/>
+          <p:cNvPr id="111" name="Google Shape;111;p19"/>
           <p:cNvSpPr txBox="1"/>
           <p:nvPr>
             <p:ph type="title"/>
@@ -8362,7 +8515,7 @@
       </p:sp>
       <p:sp>
         <p:nvSpPr>
-          <p:cNvPr id="107" name="Google Shape;107;p18"/>
+          <p:cNvPr id="112" name="Google Shape;112;p19"/>
           <p:cNvSpPr txBox="1"/>
           <p:nvPr>
             <p:ph idx="1" type="body"/>
@@ -8563,7 +8716,7 @@
       </p:sp>
       <p:pic>
         <p:nvPicPr>
-          <p:cNvPr id="108" name="Google Shape;108;p18"/>
+          <p:cNvPr id="113" name="Google Shape;113;p19"/>
           <p:cNvPicPr preferRelativeResize="0"/>
           <p:nvPr/>
         </p:nvPicPr>
@@ -8591,7 +8744,7 @@
       </p:pic>
       <p:grpSp>
         <p:nvGrpSpPr>
-          <p:cNvPr id="109" name="Google Shape;109;p18"/>
+          <p:cNvPr id="114" name="Google Shape;114;p19"/>
           <p:cNvGrpSpPr/>
           <p:nvPr/>
         </p:nvGrpSpPr>
@@ -8605,7 +8758,7 @@
         </p:grpSpPr>
         <p:pic>
           <p:nvPicPr>
-            <p:cNvPr id="110" name="Google Shape;110;p18"/>
+            <p:cNvPr id="115" name="Google Shape;115;p19"/>
             <p:cNvPicPr preferRelativeResize="0"/>
             <p:nvPr/>
           </p:nvPicPr>
@@ -8633,7 +8786,7 @@
         </p:pic>
         <p:pic>
           <p:nvPicPr>
-            <p:cNvPr id="111" name="Google Shape;111;p18"/>
+            <p:cNvPr id="116" name="Google Shape;116;p19"/>
             <p:cNvPicPr preferRelativeResize="0"/>
             <p:nvPr/>
           </p:nvPicPr>
@@ -8661,7 +8814,7 @@
         </p:pic>
         <p:pic>
           <p:nvPicPr>
-            <p:cNvPr id="112" name="Google Shape;112;p18"/>
+            <p:cNvPr id="117" name="Google Shape;117;p19"/>
             <p:cNvPicPr preferRelativeResize="0"/>
             <p:nvPr/>
           </p:nvPicPr>
@@ -8689,7 +8842,7 @@
         </p:pic>
         <p:pic>
           <p:nvPicPr>
-            <p:cNvPr id="113" name="Google Shape;113;p18"/>
+            <p:cNvPr id="118" name="Google Shape;118;p19"/>
             <p:cNvPicPr preferRelativeResize="0"/>
             <p:nvPr/>
           </p:nvPicPr>
@@ -8717,7 +8870,7 @@
         </p:pic>
         <p:pic>
           <p:nvPicPr>
-            <p:cNvPr id="114" name="Google Shape;114;p18"/>
+            <p:cNvPr id="119" name="Google Shape;119;p19"/>
             <p:cNvPicPr preferRelativeResize="0"/>
             <p:nvPr/>
           </p:nvPicPr>
@@ -8745,7 +8898,7 @@
         </p:pic>
         <p:pic>
           <p:nvPicPr>
-            <p:cNvPr id="115" name="Google Shape;115;p18"/>
+            <p:cNvPr id="120" name="Google Shape;120;p19"/>
             <p:cNvPicPr preferRelativeResize="0"/>
             <p:nvPr/>
           </p:nvPicPr>
@@ -8773,7 +8926,7 @@
         </p:pic>
         <p:pic>
           <p:nvPicPr>
-            <p:cNvPr id="116" name="Google Shape;116;p18"/>
+            <p:cNvPr id="121" name="Google Shape;121;p19"/>
             <p:cNvPicPr preferRelativeResize="0"/>
             <p:nvPr/>
           </p:nvPicPr>
@@ -8801,7 +8954,7 @@
         </p:pic>
         <p:pic>
           <p:nvPicPr>
-            <p:cNvPr id="117" name="Google Shape;117;p18"/>
+            <p:cNvPr id="122" name="Google Shape;122;p19"/>
             <p:cNvPicPr preferRelativeResize="0"/>
             <p:nvPr/>
           </p:nvPicPr>
@@ -8829,7 +8982,7 @@
         </p:pic>
         <p:pic>
           <p:nvPicPr>
-            <p:cNvPr id="118" name="Google Shape;118;p18"/>
+            <p:cNvPr id="123" name="Google Shape;123;p19"/>
             <p:cNvPicPr preferRelativeResize="0"/>
             <p:nvPr/>
           </p:nvPicPr>
@@ -8857,7 +9010,7 @@
         </p:pic>
         <p:pic>
           <p:nvPicPr>
-            <p:cNvPr id="119" name="Google Shape;119;p18"/>
+            <p:cNvPr id="124" name="Google Shape;124;p19"/>
             <p:cNvPicPr preferRelativeResize="0"/>
             <p:nvPr/>
           </p:nvPicPr>
@@ -8885,7 +9038,7 @@
         </p:pic>
         <p:pic>
           <p:nvPicPr>
-            <p:cNvPr id="120" name="Google Shape;120;p18"/>
+            <p:cNvPr id="125" name="Google Shape;125;p19"/>
             <p:cNvPicPr preferRelativeResize="0"/>
             <p:nvPr/>
           </p:nvPicPr>
@@ -8920,12 +9073,12 @@
 </p:sld>
 </file>
 
-<file path=ppt/slides/slide7.xml><?xml version="1.0" encoding="utf-8"?>
+<file path=ppt/slides/slide8.xml><?xml version="1.0" encoding="utf-8"?>
 <p:sld xmlns:a="http://schemas.openxmlformats.org/drawingml/2006/main" xmlns:r="http://schemas.openxmlformats.org/officeDocument/2006/relationships" xmlns:mc="http://schemas.openxmlformats.org/markup-compatibility/2006" xmlns:mv="urn:schemas-microsoft-com:mac:vml" xmlns:p="http://schemas.openxmlformats.org/presentationml/2006/main" xmlns:c="http://schemas.openxmlformats.org/drawingml/2006/chart" xmlns:dgm="http://schemas.openxmlformats.org/drawingml/2006/diagram" xmlns:o="urn:schemas-microsoft-com:office:office" xmlns:v="urn:schemas-microsoft-com:vml" xmlns:pvml="urn:schemas-microsoft-com:office:powerpoint" xmlns:com="http://schemas.openxmlformats.org/drawingml/2006/compatibility" xmlns:p14="http://schemas.microsoft.com/office/powerpoint/2010/main" xmlns:p15="http://schemas.microsoft.com/office/powerpoint/2012/main">
   <p:cSld>
     <p:spTree>
       <p:nvGrpSpPr>
-        <p:cNvPr id="124" name="Shape 124"/>
+        <p:cNvPr id="129" name="Shape 129"/>
         <p:cNvGrpSpPr/>
         <p:nvPr/>
       </p:nvGrpSpPr>
@@ -8939,7 +9092,7 @@
       </p:grpSpPr>
       <p:sp>
         <p:nvSpPr>
-          <p:cNvPr id="125" name="Google Shape;125;p19"/>
+          <p:cNvPr id="130" name="Google Shape;130;p20"/>
           <p:cNvSpPr txBox="1"/>
           <p:nvPr>
             <p:ph type="title"/>
@@ -8979,7 +9132,7 @@
       </p:sp>
       <p:sp>
         <p:nvSpPr>
-          <p:cNvPr id="126" name="Google Shape;126;p19"/>
+          <p:cNvPr id="131" name="Google Shape;131;p20"/>
           <p:cNvSpPr txBox="1"/>
           <p:nvPr>
             <p:ph idx="1" type="body"/>
@@ -9049,12 +9202,12 @@
 </p:sld>
 </file>
 
-<file path=ppt/slides/slide8.xml><?xml version="1.0" encoding="utf-8"?>
+<file path=ppt/slides/slide9.xml><?xml version="1.0" encoding="utf-8"?>
 <p:sld xmlns:a="http://schemas.openxmlformats.org/drawingml/2006/main" xmlns:r="http://schemas.openxmlformats.org/officeDocument/2006/relationships" xmlns:mc="http://schemas.openxmlformats.org/markup-compatibility/2006" xmlns:mv="urn:schemas-microsoft-com:mac:vml" xmlns:p="http://schemas.openxmlformats.org/presentationml/2006/main" xmlns:c="http://schemas.openxmlformats.org/drawingml/2006/chart" xmlns:dgm="http://schemas.openxmlformats.org/drawingml/2006/diagram" xmlns:o="urn:schemas-microsoft-com:office:office" xmlns:v="urn:schemas-microsoft-com:vml" xmlns:pvml="urn:schemas-microsoft-com:office:powerpoint" xmlns:com="http://schemas.openxmlformats.org/drawingml/2006/compatibility" xmlns:p14="http://schemas.microsoft.com/office/powerpoint/2010/main" xmlns:p15="http://schemas.microsoft.com/office/powerpoint/2012/main">
   <p:cSld>
     <p:spTree>
       <p:nvGrpSpPr>
-        <p:cNvPr id="130" name="Shape 130"/>
+        <p:cNvPr id="135" name="Shape 135"/>
         <p:cNvGrpSpPr/>
         <p:nvPr/>
       </p:nvGrpSpPr>
@@ -9068,7 +9221,7 @@
       </p:grpSpPr>
       <p:sp>
         <p:nvSpPr>
-          <p:cNvPr id="131" name="Google Shape;131;p20"/>
+          <p:cNvPr id="136" name="Google Shape;136;p21"/>
           <p:cNvSpPr txBox="1"/>
           <p:nvPr>
             <p:ph type="title"/>

</xml_diff>

<commit_message>
add the author name in the first slide
</commit_message>
<xml_diff>
--- a/slides/meetup_01/01_school_of_ai.pptx
+++ b/slides/meetup_01/01_school_of_ai.pptx
@@ -805,7 +805,7 @@
   <p:cSld>
     <p:spTree>
       <p:nvGrpSpPr>
-        <p:cNvPr id="70" name="Shape 70"/>
+        <p:cNvPr id="71" name="Shape 71"/>
         <p:cNvGrpSpPr/>
         <p:nvPr/>
       </p:nvGrpSpPr>
@@ -819,7 +819,7 @@
       </p:grpSpPr>
       <p:sp>
         <p:nvSpPr>
-          <p:cNvPr id="71" name="Google Shape;71;gc6f73a04f_0_25:notes"/>
+          <p:cNvPr id="72" name="Google Shape;72;gc6f73a04f_0_25:notes"/>
           <p:cNvSpPr/>
           <p:nvPr>
             <p:ph idx="2" type="sldImg"/>
@@ -854,7 +854,7 @@
       </p:sp>
       <p:sp>
         <p:nvSpPr>
-          <p:cNvPr id="72" name="Google Shape;72;gc6f73a04f_0_25:notes"/>
+          <p:cNvPr id="73" name="Google Shape;73;gc6f73a04f_0_25:notes"/>
           <p:cNvSpPr txBox="1"/>
           <p:nvPr>
             <p:ph idx="1" type="body"/>
@@ -904,7 +904,7 @@
   <p:cSld>
     <p:spTree>
       <p:nvGrpSpPr>
-        <p:cNvPr id="75" name="Shape 75"/>
+        <p:cNvPr id="76" name="Shape 76"/>
         <p:cNvGrpSpPr/>
         <p:nvPr/>
       </p:nvGrpSpPr>
@@ -918,7 +918,7 @@
       </p:grpSpPr>
       <p:sp>
         <p:nvSpPr>
-          <p:cNvPr id="76" name="Google Shape;76;gc6f73a04f_0_5:notes"/>
+          <p:cNvPr id="77" name="Google Shape;77;gc6f73a04f_0_5:notes"/>
           <p:cNvSpPr/>
           <p:nvPr>
             <p:ph idx="2" type="sldImg"/>
@@ -953,7 +953,7 @@
       </p:sp>
       <p:sp>
         <p:nvSpPr>
-          <p:cNvPr id="77" name="Google Shape;77;gc6f73a04f_0_5:notes"/>
+          <p:cNvPr id="78" name="Google Shape;78;gc6f73a04f_0_5:notes"/>
           <p:cNvSpPr txBox="1"/>
           <p:nvPr>
             <p:ph idx="1" type="body"/>
@@ -1003,7 +1003,7 @@
   <p:cSld>
     <p:spTree>
       <p:nvGrpSpPr>
-        <p:cNvPr id="80" name="Shape 80"/>
+        <p:cNvPr id="81" name="Shape 81"/>
         <p:cNvGrpSpPr/>
         <p:nvPr/>
       </p:nvGrpSpPr>
@@ -1017,7 +1017,7 @@
       </p:grpSpPr>
       <p:sp>
         <p:nvSpPr>
-          <p:cNvPr id="81" name="Google Shape;81;gc6f73a04f_0_20:notes"/>
+          <p:cNvPr id="82" name="Google Shape;82;gc6f73a04f_0_20:notes"/>
           <p:cNvSpPr/>
           <p:nvPr>
             <p:ph idx="2" type="sldImg"/>
@@ -1052,7 +1052,7 @@
       </p:sp>
       <p:sp>
         <p:nvSpPr>
-          <p:cNvPr id="82" name="Google Shape;82;gc6f73a04f_0_20:notes"/>
+          <p:cNvPr id="83" name="Google Shape;83;gc6f73a04f_0_20:notes"/>
           <p:cNvSpPr txBox="1"/>
           <p:nvPr>
             <p:ph idx="1" type="body"/>
@@ -1102,7 +1102,7 @@
   <p:cSld>
     <p:spTree>
       <p:nvGrpSpPr>
-        <p:cNvPr id="91" name="Shape 91"/>
+        <p:cNvPr id="92" name="Shape 92"/>
         <p:cNvGrpSpPr/>
         <p:nvPr/>
       </p:nvGrpSpPr>
@@ -1116,7 +1116,7 @@
       </p:grpSpPr>
       <p:sp>
         <p:nvSpPr>
-          <p:cNvPr id="92" name="Google Shape;92;g41d2583503_0_83:notes"/>
+          <p:cNvPr id="93" name="Google Shape;93;g41d2583503_0_83:notes"/>
           <p:cNvSpPr/>
           <p:nvPr>
             <p:ph idx="2" type="sldImg"/>
@@ -1151,7 +1151,7 @@
       </p:sp>
       <p:sp>
         <p:nvSpPr>
-          <p:cNvPr id="93" name="Google Shape;93;g41d2583503_0_83:notes"/>
+          <p:cNvPr id="94" name="Google Shape;94;g41d2583503_0_83:notes"/>
           <p:cNvSpPr txBox="1"/>
           <p:nvPr>
             <p:ph idx="1" type="body"/>
@@ -1201,7 +1201,7 @@
   <p:cSld>
     <p:spTree>
       <p:nvGrpSpPr>
-        <p:cNvPr id="99" name="Shape 99"/>
+        <p:cNvPr id="100" name="Shape 100"/>
         <p:cNvGrpSpPr/>
         <p:nvPr/>
       </p:nvGrpSpPr>
@@ -1215,7 +1215,7 @@
       </p:grpSpPr>
       <p:sp>
         <p:nvSpPr>
-          <p:cNvPr id="100" name="Google Shape;100;g41d2583503_0_98:notes"/>
+          <p:cNvPr id="101" name="Google Shape;101;g41d2583503_0_98:notes"/>
           <p:cNvSpPr/>
           <p:nvPr>
             <p:ph idx="2" type="sldImg"/>
@@ -1250,7 +1250,7 @@
       </p:sp>
       <p:sp>
         <p:nvSpPr>
-          <p:cNvPr id="101" name="Google Shape;101;g41d2583503_0_98:notes"/>
+          <p:cNvPr id="102" name="Google Shape;102;g41d2583503_0_98:notes"/>
           <p:cNvSpPr txBox="1"/>
           <p:nvPr>
             <p:ph idx="1" type="body"/>
@@ -1300,7 +1300,7 @@
   <p:cSld>
     <p:spTree>
       <p:nvGrpSpPr>
-        <p:cNvPr id="107" name="Shape 107"/>
+        <p:cNvPr id="108" name="Shape 108"/>
         <p:cNvGrpSpPr/>
         <p:nvPr/>
       </p:nvGrpSpPr>
@@ -1314,7 +1314,7 @@
       </p:grpSpPr>
       <p:sp>
         <p:nvSpPr>
-          <p:cNvPr id="108" name="Google Shape;108;g41d2583503_0_158:notes"/>
+          <p:cNvPr id="109" name="Google Shape;109;g41d2583503_0_158:notes"/>
           <p:cNvSpPr/>
           <p:nvPr>
             <p:ph idx="2" type="sldImg"/>
@@ -1349,7 +1349,7 @@
       </p:sp>
       <p:sp>
         <p:nvSpPr>
-          <p:cNvPr id="109" name="Google Shape;109;g41d2583503_0_158:notes"/>
+          <p:cNvPr id="110" name="Google Shape;110;g41d2583503_0_158:notes"/>
           <p:cNvSpPr txBox="1"/>
           <p:nvPr>
             <p:ph idx="1" type="body"/>
@@ -1399,7 +1399,7 @@
   <p:cSld>
     <p:spTree>
       <p:nvGrpSpPr>
-        <p:cNvPr id="126" name="Shape 126"/>
+        <p:cNvPr id="127" name="Shape 127"/>
         <p:cNvGrpSpPr/>
         <p:nvPr/>
       </p:nvGrpSpPr>
@@ -1413,7 +1413,7 @@
       </p:grpSpPr>
       <p:sp>
         <p:nvSpPr>
-          <p:cNvPr id="127" name="Google Shape;127;gc6f73a04f_0_9:notes"/>
+          <p:cNvPr id="128" name="Google Shape;128;gc6f73a04f_0_9:notes"/>
           <p:cNvSpPr/>
           <p:nvPr>
             <p:ph idx="2" type="sldImg"/>
@@ -1448,7 +1448,7 @@
       </p:sp>
       <p:sp>
         <p:nvSpPr>
-          <p:cNvPr id="128" name="Google Shape;128;gc6f73a04f_0_9:notes"/>
+          <p:cNvPr id="129" name="Google Shape;129;gc6f73a04f_0_9:notes"/>
           <p:cNvSpPr txBox="1"/>
           <p:nvPr>
             <p:ph idx="1" type="body"/>
@@ -1498,7 +1498,7 @@
   <p:cSld>
     <p:spTree>
       <p:nvGrpSpPr>
-        <p:cNvPr id="132" name="Shape 132"/>
+        <p:cNvPr id="133" name="Shape 133"/>
         <p:cNvGrpSpPr/>
         <p:nvPr/>
       </p:nvGrpSpPr>
@@ -1512,7 +1512,7 @@
       </p:grpSpPr>
       <p:sp>
         <p:nvSpPr>
-          <p:cNvPr id="133" name="Google Shape;133;g3f3c3dcedb_0_10:notes"/>
+          <p:cNvPr id="134" name="Google Shape;134;g3f3c3dcedb_0_10:notes"/>
           <p:cNvSpPr/>
           <p:nvPr>
             <p:ph idx="2" type="sldImg"/>
@@ -1547,7 +1547,7 @@
       </p:sp>
       <p:sp>
         <p:nvSpPr>
-          <p:cNvPr id="134" name="Google Shape;134;g3f3c3dcedb_0_10:notes"/>
+          <p:cNvPr id="135" name="Google Shape;135;g3f3c3dcedb_0_10:notes"/>
           <p:cNvSpPr txBox="1"/>
           <p:nvPr>
             <p:ph idx="1" type="body"/>
@@ -7579,6 +7579,80 @@
           </a:ln>
         </p:spPr>
       </p:pic>
+      <p:sp>
+        <p:nvSpPr>
+          <p:cNvPr id="70" name="Google Shape;70;p13"/>
+          <p:cNvSpPr txBox="1"/>
+          <p:nvPr/>
+        </p:nvSpPr>
+        <p:spPr>
+          <a:xfrm>
+            <a:off x="3355950" y="4564700"/>
+            <a:ext cx="2432100" cy="490800"/>
+          </a:xfrm>
+          <a:prstGeom prst="rect">
+            <a:avLst/>
+          </a:prstGeom>
+          <a:noFill/>
+          <a:ln>
+            <a:noFill/>
+          </a:ln>
+        </p:spPr>
+        <p:txBody>
+          <a:bodyPr anchorCtr="0" anchor="t" bIns="91425" lIns="91425" spcFirstLastPara="1" rIns="91425" wrap="square" tIns="91425">
+            <a:noAutofit/>
+          </a:bodyPr>
+          <a:lstStyle/>
+          <a:p>
+            <a:pPr indent="0" lvl="0" marL="0" rtl="0" algn="ctr">
+              <a:spcBef>
+                <a:spcPts val="0"/>
+              </a:spcBef>
+              <a:spcAft>
+                <a:spcPts val="0"/>
+              </a:spcAft>
+              <a:buNone/>
+            </a:pPr>
+            <a:r>
+              <a:rPr lang="en">
+                <a:solidFill>
+                  <a:srgbClr val="FFFFFF"/>
+                </a:solidFill>
+              </a:rPr>
+              <a:t>Hamidreza Hosseinkhani</a:t>
+            </a:r>
+            <a:endParaRPr>
+              <a:solidFill>
+                <a:srgbClr val="FFFFFF"/>
+              </a:solidFill>
+            </a:endParaRPr>
+          </a:p>
+          <a:p>
+            <a:pPr indent="0" lvl="0" marL="0" rtl="0" algn="ctr">
+              <a:spcBef>
+                <a:spcPts val="0"/>
+              </a:spcBef>
+              <a:spcAft>
+                <a:spcPts val="0"/>
+              </a:spcAft>
+              <a:buNone/>
+            </a:pPr>
+            <a:r>
+              <a:rPr lang="en" sz="1300">
+                <a:solidFill>
+                  <a:srgbClr val="FFFFFF"/>
+                </a:solidFill>
+              </a:rPr>
+              <a:t>School of AI - 2018</a:t>
+            </a:r>
+            <a:endParaRPr sz="1300">
+              <a:solidFill>
+                <a:srgbClr val="FFFFFF"/>
+              </a:solidFill>
+            </a:endParaRPr>
+          </a:p>
+        </p:txBody>
+      </p:sp>
     </p:spTree>
   </p:cSld>
   <p:clrMapOvr>
@@ -7592,7 +7666,7 @@
   <p:cSld>
     <p:spTree>
       <p:nvGrpSpPr>
-        <p:cNvPr id="73" name="Shape 73"/>
+        <p:cNvPr id="74" name="Shape 74"/>
         <p:cNvGrpSpPr/>
         <p:nvPr/>
       </p:nvGrpSpPr>
@@ -7606,7 +7680,7 @@
       </p:grpSpPr>
       <p:pic>
         <p:nvPicPr>
-          <p:cNvPr id="74" name="Google Shape;74;p14"/>
+          <p:cNvPr id="75" name="Google Shape;75;p14"/>
           <p:cNvPicPr preferRelativeResize="0"/>
           <p:nvPr/>
         </p:nvPicPr>
@@ -7645,7 +7719,7 @@
   <p:cSld>
     <p:spTree>
       <p:nvGrpSpPr>
-        <p:cNvPr id="78" name="Shape 78"/>
+        <p:cNvPr id="79" name="Shape 79"/>
         <p:cNvGrpSpPr/>
         <p:nvPr/>
       </p:nvGrpSpPr>
@@ -7659,7 +7733,7 @@
       </p:grpSpPr>
       <p:pic>
         <p:nvPicPr>
-          <p:cNvPr id="79" name="Google Shape;79;p15"/>
+          <p:cNvPr id="80" name="Google Shape;80;p15"/>
           <p:cNvPicPr preferRelativeResize="0"/>
           <p:nvPr/>
         </p:nvPicPr>
@@ -7698,7 +7772,7 @@
   <p:cSld>
     <p:spTree>
       <p:nvGrpSpPr>
-        <p:cNvPr id="83" name="Shape 83"/>
+        <p:cNvPr id="84" name="Shape 84"/>
         <p:cNvGrpSpPr/>
         <p:nvPr/>
       </p:nvGrpSpPr>
@@ -7712,7 +7786,7 @@
       </p:grpSpPr>
       <p:sp>
         <p:nvSpPr>
-          <p:cNvPr id="84" name="Google Shape;84;p16"/>
+          <p:cNvPr id="85" name="Google Shape;85;p16"/>
           <p:cNvSpPr txBox="1"/>
           <p:nvPr>
             <p:ph type="title"/>
@@ -7752,7 +7826,7 @@
       </p:sp>
       <p:sp>
         <p:nvSpPr>
-          <p:cNvPr id="85" name="Google Shape;85;p16"/>
+          <p:cNvPr id="86" name="Google Shape;86;p16"/>
           <p:cNvSpPr txBox="1"/>
           <p:nvPr>
             <p:ph idx="1" type="body"/>
@@ -7839,7 +7913,7 @@
       </p:sp>
       <p:pic>
         <p:nvPicPr>
-          <p:cNvPr id="86" name="Google Shape;86;p16"/>
+          <p:cNvPr id="87" name="Google Shape;87;p16"/>
           <p:cNvPicPr preferRelativeResize="0"/>
           <p:nvPr/>
         </p:nvPicPr>
@@ -7867,7 +7941,7 @@
       </p:pic>
       <p:sp>
         <p:nvSpPr>
-          <p:cNvPr id="87" name="Google Shape;87;p16"/>
+          <p:cNvPr id="88" name="Google Shape;88;p16"/>
           <p:cNvSpPr txBox="1"/>
           <p:nvPr/>
         </p:nvSpPr>
@@ -7909,7 +7983,7 @@
       </p:sp>
       <p:pic>
         <p:nvPicPr>
-          <p:cNvPr id="88" name="Google Shape;88;p16"/>
+          <p:cNvPr id="89" name="Google Shape;89;p16"/>
           <p:cNvPicPr preferRelativeResize="0"/>
           <p:nvPr/>
         </p:nvPicPr>
@@ -7937,7 +8011,7 @@
       </p:pic>
       <p:pic>
         <p:nvPicPr>
-          <p:cNvPr id="89" name="Google Shape;89;p16"/>
+          <p:cNvPr id="90" name="Google Shape;90;p16"/>
           <p:cNvPicPr preferRelativeResize="0"/>
           <p:nvPr/>
         </p:nvPicPr>
@@ -7965,7 +8039,7 @@
       </p:pic>
       <p:sp>
         <p:nvSpPr>
-          <p:cNvPr id="90" name="Google Shape;90;p16"/>
+          <p:cNvPr id="91" name="Google Shape;91;p16"/>
           <p:cNvSpPr txBox="1"/>
           <p:nvPr/>
         </p:nvSpPr>
@@ -8018,7 +8092,7 @@
   <p:cSld>
     <p:spTree>
       <p:nvGrpSpPr>
-        <p:cNvPr id="94" name="Shape 94"/>
+        <p:cNvPr id="95" name="Shape 95"/>
         <p:cNvGrpSpPr/>
         <p:nvPr/>
       </p:nvGrpSpPr>
@@ -8032,7 +8106,7 @@
       </p:grpSpPr>
       <p:sp>
         <p:nvSpPr>
-          <p:cNvPr id="95" name="Google Shape;95;p17"/>
+          <p:cNvPr id="96" name="Google Shape;96;p17"/>
           <p:cNvSpPr txBox="1"/>
           <p:nvPr>
             <p:ph type="title"/>
@@ -8072,7 +8146,7 @@
       </p:sp>
       <p:sp>
         <p:nvSpPr>
-          <p:cNvPr id="96" name="Google Shape;96;p17"/>
+          <p:cNvPr id="97" name="Google Shape;97;p17"/>
           <p:cNvSpPr txBox="1"/>
           <p:nvPr>
             <p:ph idx="1" type="body"/>
@@ -8158,7 +8232,7 @@
       </p:sp>
       <p:pic>
         <p:nvPicPr>
-          <p:cNvPr id="97" name="Google Shape;97;p17"/>
+          <p:cNvPr id="98" name="Google Shape;98;p17"/>
           <p:cNvPicPr preferRelativeResize="0"/>
           <p:nvPr/>
         </p:nvPicPr>
@@ -8186,7 +8260,7 @@
       </p:pic>
       <p:sp>
         <p:nvSpPr>
-          <p:cNvPr id="98" name="Google Shape;98;p17"/>
+          <p:cNvPr id="99" name="Google Shape;99;p17"/>
           <p:cNvSpPr txBox="1"/>
           <p:nvPr/>
         </p:nvSpPr>
@@ -8239,7 +8313,7 @@
   <p:cSld>
     <p:spTree>
       <p:nvGrpSpPr>
-        <p:cNvPr id="102" name="Shape 102"/>
+        <p:cNvPr id="103" name="Shape 103"/>
         <p:cNvGrpSpPr/>
         <p:nvPr/>
       </p:nvGrpSpPr>
@@ -8253,7 +8327,7 @@
       </p:grpSpPr>
       <p:sp>
         <p:nvSpPr>
-          <p:cNvPr id="103" name="Google Shape;103;p18"/>
+          <p:cNvPr id="104" name="Google Shape;104;p18"/>
           <p:cNvSpPr txBox="1"/>
           <p:nvPr>
             <p:ph type="title"/>
@@ -8293,7 +8367,7 @@
       </p:sp>
       <p:sp>
         <p:nvSpPr>
-          <p:cNvPr id="104" name="Google Shape;104;p18"/>
+          <p:cNvPr id="105" name="Google Shape;105;p18"/>
           <p:cNvSpPr txBox="1"/>
           <p:nvPr>
             <p:ph idx="1" type="body"/>
@@ -8394,7 +8468,7 @@
       </p:sp>
       <p:pic>
         <p:nvPicPr>
-          <p:cNvPr id="105" name="Google Shape;105;p18"/>
+          <p:cNvPr id="106" name="Google Shape;106;p18"/>
           <p:cNvPicPr preferRelativeResize="0"/>
           <p:nvPr/>
         </p:nvPicPr>
@@ -8422,7 +8496,7 @@
       </p:pic>
       <p:pic>
         <p:nvPicPr>
-          <p:cNvPr id="106" name="Google Shape;106;p18"/>
+          <p:cNvPr id="107" name="Google Shape;107;p18"/>
           <p:cNvPicPr preferRelativeResize="0"/>
           <p:nvPr/>
         </p:nvPicPr>
@@ -8461,7 +8535,7 @@
   <p:cSld>
     <p:spTree>
       <p:nvGrpSpPr>
-        <p:cNvPr id="110" name="Shape 110"/>
+        <p:cNvPr id="111" name="Shape 111"/>
         <p:cNvGrpSpPr/>
         <p:nvPr/>
       </p:nvGrpSpPr>
@@ -8475,7 +8549,7 @@
       </p:grpSpPr>
       <p:sp>
         <p:nvSpPr>
-          <p:cNvPr id="111" name="Google Shape;111;p19"/>
+          <p:cNvPr id="112" name="Google Shape;112;p19"/>
           <p:cNvSpPr txBox="1"/>
           <p:nvPr>
             <p:ph type="title"/>
@@ -8515,7 +8589,7 @@
       </p:sp>
       <p:sp>
         <p:nvSpPr>
-          <p:cNvPr id="112" name="Google Shape;112;p19"/>
+          <p:cNvPr id="113" name="Google Shape;113;p19"/>
           <p:cNvSpPr txBox="1"/>
           <p:nvPr>
             <p:ph idx="1" type="body"/>
@@ -8716,7 +8790,7 @@
       </p:sp>
       <p:pic>
         <p:nvPicPr>
-          <p:cNvPr id="113" name="Google Shape;113;p19"/>
+          <p:cNvPr id="114" name="Google Shape;114;p19"/>
           <p:cNvPicPr preferRelativeResize="0"/>
           <p:nvPr/>
         </p:nvPicPr>
@@ -8744,7 +8818,7 @@
       </p:pic>
       <p:grpSp>
         <p:nvGrpSpPr>
-          <p:cNvPr id="114" name="Google Shape;114;p19"/>
+          <p:cNvPr id="115" name="Google Shape;115;p19"/>
           <p:cNvGrpSpPr/>
           <p:nvPr/>
         </p:nvGrpSpPr>
@@ -8758,7 +8832,7 @@
         </p:grpSpPr>
         <p:pic>
           <p:nvPicPr>
-            <p:cNvPr id="115" name="Google Shape;115;p19"/>
+            <p:cNvPr id="116" name="Google Shape;116;p19"/>
             <p:cNvPicPr preferRelativeResize="0"/>
             <p:nvPr/>
           </p:nvPicPr>
@@ -8786,7 +8860,7 @@
         </p:pic>
         <p:pic>
           <p:nvPicPr>
-            <p:cNvPr id="116" name="Google Shape;116;p19"/>
+            <p:cNvPr id="117" name="Google Shape;117;p19"/>
             <p:cNvPicPr preferRelativeResize="0"/>
             <p:nvPr/>
           </p:nvPicPr>
@@ -8814,7 +8888,7 @@
         </p:pic>
         <p:pic>
           <p:nvPicPr>
-            <p:cNvPr id="117" name="Google Shape;117;p19"/>
+            <p:cNvPr id="118" name="Google Shape;118;p19"/>
             <p:cNvPicPr preferRelativeResize="0"/>
             <p:nvPr/>
           </p:nvPicPr>
@@ -8842,7 +8916,7 @@
         </p:pic>
         <p:pic>
           <p:nvPicPr>
-            <p:cNvPr id="118" name="Google Shape;118;p19"/>
+            <p:cNvPr id="119" name="Google Shape;119;p19"/>
             <p:cNvPicPr preferRelativeResize="0"/>
             <p:nvPr/>
           </p:nvPicPr>
@@ -8870,7 +8944,7 @@
         </p:pic>
         <p:pic>
           <p:nvPicPr>
-            <p:cNvPr id="119" name="Google Shape;119;p19"/>
+            <p:cNvPr id="120" name="Google Shape;120;p19"/>
             <p:cNvPicPr preferRelativeResize="0"/>
             <p:nvPr/>
           </p:nvPicPr>
@@ -8898,7 +8972,7 @@
         </p:pic>
         <p:pic>
           <p:nvPicPr>
-            <p:cNvPr id="120" name="Google Shape;120;p19"/>
+            <p:cNvPr id="121" name="Google Shape;121;p19"/>
             <p:cNvPicPr preferRelativeResize="0"/>
             <p:nvPr/>
           </p:nvPicPr>
@@ -8926,7 +9000,7 @@
         </p:pic>
         <p:pic>
           <p:nvPicPr>
-            <p:cNvPr id="121" name="Google Shape;121;p19"/>
+            <p:cNvPr id="122" name="Google Shape;122;p19"/>
             <p:cNvPicPr preferRelativeResize="0"/>
             <p:nvPr/>
           </p:nvPicPr>
@@ -8954,7 +9028,7 @@
         </p:pic>
         <p:pic>
           <p:nvPicPr>
-            <p:cNvPr id="122" name="Google Shape;122;p19"/>
+            <p:cNvPr id="123" name="Google Shape;123;p19"/>
             <p:cNvPicPr preferRelativeResize="0"/>
             <p:nvPr/>
           </p:nvPicPr>
@@ -8982,7 +9056,7 @@
         </p:pic>
         <p:pic>
           <p:nvPicPr>
-            <p:cNvPr id="123" name="Google Shape;123;p19"/>
+            <p:cNvPr id="124" name="Google Shape;124;p19"/>
             <p:cNvPicPr preferRelativeResize="0"/>
             <p:nvPr/>
           </p:nvPicPr>
@@ -9010,7 +9084,7 @@
         </p:pic>
         <p:pic>
           <p:nvPicPr>
-            <p:cNvPr id="124" name="Google Shape;124;p19"/>
+            <p:cNvPr id="125" name="Google Shape;125;p19"/>
             <p:cNvPicPr preferRelativeResize="0"/>
             <p:nvPr/>
           </p:nvPicPr>
@@ -9038,7 +9112,7 @@
         </p:pic>
         <p:pic>
           <p:nvPicPr>
-            <p:cNvPr id="125" name="Google Shape;125;p19"/>
+            <p:cNvPr id="126" name="Google Shape;126;p19"/>
             <p:cNvPicPr preferRelativeResize="0"/>
             <p:nvPr/>
           </p:nvPicPr>
@@ -9078,7 +9152,7 @@
   <p:cSld>
     <p:spTree>
       <p:nvGrpSpPr>
-        <p:cNvPr id="129" name="Shape 129"/>
+        <p:cNvPr id="130" name="Shape 130"/>
         <p:cNvGrpSpPr/>
         <p:nvPr/>
       </p:nvGrpSpPr>
@@ -9092,7 +9166,7 @@
       </p:grpSpPr>
       <p:sp>
         <p:nvSpPr>
-          <p:cNvPr id="130" name="Google Shape;130;p20"/>
+          <p:cNvPr id="131" name="Google Shape;131;p20"/>
           <p:cNvSpPr txBox="1"/>
           <p:nvPr>
             <p:ph type="title"/>
@@ -9132,7 +9206,7 @@
       </p:sp>
       <p:sp>
         <p:nvSpPr>
-          <p:cNvPr id="131" name="Google Shape;131;p20"/>
+          <p:cNvPr id="132" name="Google Shape;132;p20"/>
           <p:cNvSpPr txBox="1"/>
           <p:nvPr>
             <p:ph idx="1" type="body"/>
@@ -9207,7 +9281,7 @@
   <p:cSld>
     <p:spTree>
       <p:nvGrpSpPr>
-        <p:cNvPr id="135" name="Shape 135"/>
+        <p:cNvPr id="136" name="Shape 136"/>
         <p:cNvGrpSpPr/>
         <p:nvPr/>
       </p:nvGrpSpPr>
@@ -9221,7 +9295,7 @@
       </p:grpSpPr>
       <p:sp>
         <p:nvSpPr>
-          <p:cNvPr id="136" name="Google Shape;136;p21"/>
+          <p:cNvPr id="137" name="Google Shape;137;p21"/>
           <p:cNvSpPr txBox="1"/>
           <p:nvPr>
             <p:ph type="title"/>
@@ -9268,6 +9342,285 @@
 </file>
 
 <file path=ppt/theme/theme1.xml><?xml version="1.0" encoding="utf-8"?>
+<a:theme xmlns:a="http://schemas.openxmlformats.org/drawingml/2006/main" xmlns:r="http://schemas.openxmlformats.org/officeDocument/2006/relationships" name="Material">
+  <a:themeElements>
+    <a:clrScheme name="Material">
+      <a:dk1>
+        <a:srgbClr val="4285F4"/>
+      </a:dk1>
+      <a:lt1>
+        <a:srgbClr val="FFFFFF"/>
+      </a:lt1>
+      <a:dk2>
+        <a:srgbClr val="424242"/>
+      </a:dk2>
+      <a:lt2>
+        <a:srgbClr val="737373"/>
+      </a:lt2>
+      <a:accent1>
+        <a:srgbClr val="0277BD"/>
+      </a:accent1>
+      <a:accent2>
+        <a:srgbClr val="0F9D58"/>
+      </a:accent2>
+      <a:accent3>
+        <a:srgbClr val="DB4437"/>
+      </a:accent3>
+      <a:accent4>
+        <a:srgbClr val="FAFAFA"/>
+      </a:accent4>
+      <a:accent5>
+        <a:srgbClr val="4FC3F7"/>
+      </a:accent5>
+      <a:accent6>
+        <a:srgbClr val="F4B400"/>
+      </a:accent6>
+      <a:hlink>
+        <a:srgbClr val="4FC3F7"/>
+      </a:hlink>
+      <a:folHlink>
+        <a:srgbClr val="4FC3F7"/>
+      </a:folHlink>
+    </a:clrScheme>
+    <a:fontScheme name="Office">
+      <a:majorFont>
+        <a:latin typeface="Arial"/>
+        <a:ea typeface=""/>
+        <a:cs typeface=""/>
+        <a:font script="Jpan" typeface="ＭＳ Ｐゴシック"/>
+        <a:font script="Hang" typeface="맑은 고딕"/>
+        <a:font script="Hans" typeface="宋体"/>
+        <a:font script="Hant" typeface="新細明體"/>
+        <a:font script="Arab" typeface="Times New Roman"/>
+        <a:font script="Hebr" typeface="Times New Roman"/>
+        <a:font script="Thai" typeface="Angsana New"/>
+        <a:font script="Ethi" typeface="Nyala"/>
+        <a:font script="Beng" typeface="Vrinda"/>
+        <a:font script="Gujr" typeface="Shruti"/>
+        <a:font script="Khmr" typeface="MoolBoran"/>
+        <a:font script="Knda" typeface="Tunga"/>
+        <a:font script="Guru" typeface="Raavi"/>
+        <a:font script="Cans" typeface="Euphemia"/>
+        <a:font script="Cher" typeface="Plantagenet Cherokee"/>
+        <a:font script="Yiii" typeface="Microsoft Yi Baiti"/>
+        <a:font script="Tibt" typeface="Microsoft Himalaya"/>
+        <a:font script="Thaa" typeface="MV Boli"/>
+        <a:font script="Deva" typeface="Mangal"/>
+        <a:font script="Telu" typeface="Gautami"/>
+        <a:font script="Taml" typeface="Latha"/>
+        <a:font script="Syrc" typeface="Estrangelo Edessa"/>
+        <a:font script="Orya" typeface="Kalinga"/>
+        <a:font script="Mlym" typeface="Kartika"/>
+        <a:font script="Laoo" typeface="DokChampa"/>
+        <a:font script="Sinh" typeface="Iskoola Pota"/>
+        <a:font script="Mong" typeface="Mongolian Baiti"/>
+        <a:font script="Viet" typeface="Times New Roman"/>
+        <a:font script="Uigh" typeface="Microsoft Uighur"/>
+        <a:font script="Geor" typeface="Sylfaen"/>
+      </a:majorFont>
+      <a:minorFont>
+        <a:latin typeface="Arial"/>
+        <a:ea typeface=""/>
+        <a:cs typeface=""/>
+        <a:font script="Jpan" typeface="ＭＳ Ｐゴシック"/>
+        <a:font script="Hang" typeface="맑은 고딕"/>
+        <a:font script="Hans" typeface="宋体"/>
+        <a:font script="Hant" typeface="新細明體"/>
+        <a:font script="Arab" typeface="Arial"/>
+        <a:font script="Hebr" typeface="Arial"/>
+        <a:font script="Thai" typeface="Cordia New"/>
+        <a:font script="Ethi" typeface="Nyala"/>
+        <a:font script="Beng" typeface="Vrinda"/>
+        <a:font script="Gujr" typeface="Shruti"/>
+        <a:font script="Khmr" typeface="DaunPenh"/>
+        <a:font script="Knda" typeface="Tunga"/>
+        <a:font script="Guru" typeface="Raavi"/>
+        <a:font script="Cans" typeface="Euphemia"/>
+        <a:font script="Cher" typeface="Plantagenet Cherokee"/>
+        <a:font script="Yiii" typeface="Microsoft Yi Baiti"/>
+        <a:font script="Tibt" typeface="Microsoft Himalaya"/>
+        <a:font script="Thaa" typeface="MV Boli"/>
+        <a:font script="Deva" typeface="Mangal"/>
+        <a:font script="Telu" typeface="Gautami"/>
+        <a:font script="Taml" typeface="Latha"/>
+        <a:font script="Syrc" typeface="Estrangelo Edessa"/>
+        <a:font script="Orya" typeface="Kalinga"/>
+        <a:font script="Mlym" typeface="Kartika"/>
+        <a:font script="Laoo" typeface="DokChampa"/>
+        <a:font script="Sinh" typeface="Iskoola Pota"/>
+        <a:font script="Mong" typeface="Mongolian Baiti"/>
+        <a:font script="Viet" typeface="Arial"/>
+        <a:font script="Uigh" typeface="Microsoft Uighur"/>
+        <a:font script="Geor" typeface="Sylfaen"/>
+      </a:minorFont>
+    </a:fontScheme>
+    <a:fmtScheme name="Office">
+      <a:fillStyleLst>
+        <a:solidFill>
+          <a:schemeClr val="phClr"/>
+        </a:solidFill>
+        <a:gradFill rotWithShape="1">
+          <a:gsLst>
+            <a:gs pos="0">
+              <a:schemeClr val="phClr">
+                <a:tint val="50000"/>
+                <a:satMod val="300000"/>
+              </a:schemeClr>
+            </a:gs>
+            <a:gs pos="35000">
+              <a:schemeClr val="phClr">
+                <a:tint val="37000"/>
+                <a:satMod val="300000"/>
+              </a:schemeClr>
+            </a:gs>
+            <a:gs pos="100000">
+              <a:schemeClr val="phClr">
+                <a:tint val="15000"/>
+                <a:satMod val="350000"/>
+              </a:schemeClr>
+            </a:gs>
+          </a:gsLst>
+          <a:lin ang="16200000" scaled="1"/>
+        </a:gradFill>
+        <a:gradFill rotWithShape="1">
+          <a:gsLst>
+            <a:gs pos="0">
+              <a:schemeClr val="phClr">
+                <a:tint val="100000"/>
+                <a:shade val="100000"/>
+                <a:satMod val="130000"/>
+              </a:schemeClr>
+            </a:gs>
+            <a:gs pos="100000">
+              <a:schemeClr val="phClr">
+                <a:tint val="50000"/>
+                <a:shade val="100000"/>
+                <a:satMod val="350000"/>
+              </a:schemeClr>
+            </a:gs>
+          </a:gsLst>
+          <a:lin ang="16200000" scaled="0"/>
+        </a:gradFill>
+      </a:fillStyleLst>
+      <a:lnStyleLst>
+        <a:ln w="9525" cap="flat" cmpd="sng" algn="ctr">
+          <a:solidFill>
+            <a:schemeClr val="phClr">
+              <a:shade val="95000"/>
+              <a:satMod val="105000"/>
+            </a:schemeClr>
+          </a:solidFill>
+          <a:prstDash val="solid"/>
+        </a:ln>
+        <a:ln w="25400" cap="flat" cmpd="sng" algn="ctr">
+          <a:solidFill>
+            <a:schemeClr val="phClr"/>
+          </a:solidFill>
+          <a:prstDash val="solid"/>
+        </a:ln>
+        <a:ln w="38100" cap="flat" cmpd="sng" algn="ctr">
+          <a:solidFill>
+            <a:schemeClr val="phClr"/>
+          </a:solidFill>
+          <a:prstDash val="solid"/>
+        </a:ln>
+      </a:lnStyleLst>
+      <a:effectStyleLst>
+        <a:effectStyle>
+          <a:effectLst>
+            <a:outerShdw blurRad="40000" dist="20000" dir="5400000" rotWithShape="0">
+              <a:srgbClr val="000000">
+                <a:alpha val="38000"/>
+              </a:srgbClr>
+            </a:outerShdw>
+          </a:effectLst>
+        </a:effectStyle>
+        <a:effectStyle>
+          <a:effectLst>
+            <a:outerShdw blurRad="40000" dist="23000" dir="5400000" rotWithShape="0">
+              <a:srgbClr val="000000">
+                <a:alpha val="35000"/>
+              </a:srgbClr>
+            </a:outerShdw>
+          </a:effectLst>
+        </a:effectStyle>
+        <a:effectStyle>
+          <a:effectLst>
+            <a:outerShdw blurRad="40000" dist="23000" dir="5400000" rotWithShape="0">
+              <a:srgbClr val="000000">
+                <a:alpha val="35000"/>
+              </a:srgbClr>
+            </a:outerShdw>
+          </a:effectLst>
+          <a:scene3d>
+            <a:camera prst="orthographicFront">
+              <a:rot lat="0" lon="0" rev="0"/>
+            </a:camera>
+            <a:lightRig rig="threePt" dir="t">
+              <a:rot lat="0" lon="0" rev="1200000"/>
+            </a:lightRig>
+          </a:scene3d>
+          <a:sp3d>
+            <a:bevelT w="63500" h="25400"/>
+          </a:sp3d>
+        </a:effectStyle>
+      </a:effectStyleLst>
+      <a:bgFillStyleLst>
+        <a:solidFill>
+          <a:schemeClr val="phClr"/>
+        </a:solidFill>
+        <a:gradFill rotWithShape="1">
+          <a:gsLst>
+            <a:gs pos="0">
+              <a:schemeClr val="phClr">
+                <a:tint val="40000"/>
+                <a:satMod val="350000"/>
+              </a:schemeClr>
+            </a:gs>
+            <a:gs pos="40000">
+              <a:schemeClr val="phClr">
+                <a:tint val="45000"/>
+                <a:shade val="99000"/>
+                <a:satMod val="350000"/>
+              </a:schemeClr>
+            </a:gs>
+            <a:gs pos="100000">
+              <a:schemeClr val="phClr">
+                <a:shade val="20000"/>
+                <a:satMod val="255000"/>
+              </a:schemeClr>
+            </a:gs>
+          </a:gsLst>
+          <a:path path="circle">
+            <a:fillToRect l="50000" t="-80000" r="50000" b="180000"/>
+          </a:path>
+        </a:gradFill>
+        <a:gradFill rotWithShape="1">
+          <a:gsLst>
+            <a:gs pos="0">
+              <a:schemeClr val="phClr">
+                <a:tint val="80000"/>
+                <a:satMod val="300000"/>
+              </a:schemeClr>
+            </a:gs>
+            <a:gs pos="100000">
+              <a:schemeClr val="phClr">
+                <a:shade val="30000"/>
+                <a:satMod val="200000"/>
+              </a:schemeClr>
+            </a:gs>
+          </a:gsLst>
+          <a:path path="circle">
+            <a:fillToRect l="50000" t="50000" r="50000" b="50000"/>
+          </a:path>
+        </a:gradFill>
+      </a:bgFillStyleLst>
+    </a:fmtScheme>
+  </a:themeElements>
+</a:theme>
+</file>
+
+<file path=ppt/theme/theme2.xml><?xml version="1.0" encoding="utf-8"?>
 <a:theme xmlns:a="http://schemas.openxmlformats.org/drawingml/2006/main" xmlns:r="http://schemas.openxmlformats.org/officeDocument/2006/relationships">
   <a:themeElements>
     <a:clrScheme name="Default">
@@ -9544,283 +9897,4 @@
     </a:fmtScheme>
   </a:themeElements>
 </a:theme>
-</file>
-
-<file path=ppt/theme/theme2.xml><?xml version="1.0" encoding="utf-8"?>
-<a:theme xmlns:a="http://schemas.openxmlformats.org/drawingml/2006/main" xmlns:r="http://schemas.openxmlformats.org/officeDocument/2006/relationships" name="Material">
-  <a:themeElements>
-    <a:clrScheme name="Material">
-      <a:dk1>
-        <a:srgbClr val="4285F4"/>
-      </a:dk1>
-      <a:lt1>
-        <a:srgbClr val="FFFFFF"/>
-      </a:lt1>
-      <a:dk2>
-        <a:srgbClr val="424242"/>
-      </a:dk2>
-      <a:lt2>
-        <a:srgbClr val="737373"/>
-      </a:lt2>
-      <a:accent1>
-        <a:srgbClr val="0277BD"/>
-      </a:accent1>
-      <a:accent2>
-        <a:srgbClr val="0F9D58"/>
-      </a:accent2>
-      <a:accent3>
-        <a:srgbClr val="DB4437"/>
-      </a:accent3>
-      <a:accent4>
-        <a:srgbClr val="FAFAFA"/>
-      </a:accent4>
-      <a:accent5>
-        <a:srgbClr val="4FC3F7"/>
-      </a:accent5>
-      <a:accent6>
-        <a:srgbClr val="F4B400"/>
-      </a:accent6>
-      <a:hlink>
-        <a:srgbClr val="4FC3F7"/>
-      </a:hlink>
-      <a:folHlink>
-        <a:srgbClr val="4FC3F7"/>
-      </a:folHlink>
-    </a:clrScheme>
-    <a:fontScheme name="Office">
-      <a:majorFont>
-        <a:latin typeface="Arial"/>
-        <a:ea typeface=""/>
-        <a:cs typeface=""/>
-        <a:font script="Jpan" typeface="ＭＳ Ｐゴシック"/>
-        <a:font script="Hang" typeface="맑은 고딕"/>
-        <a:font script="Hans" typeface="宋体"/>
-        <a:font script="Hant" typeface="新細明體"/>
-        <a:font script="Arab" typeface="Times New Roman"/>
-        <a:font script="Hebr" typeface="Times New Roman"/>
-        <a:font script="Thai" typeface="Angsana New"/>
-        <a:font script="Ethi" typeface="Nyala"/>
-        <a:font script="Beng" typeface="Vrinda"/>
-        <a:font script="Gujr" typeface="Shruti"/>
-        <a:font script="Khmr" typeface="MoolBoran"/>
-        <a:font script="Knda" typeface="Tunga"/>
-        <a:font script="Guru" typeface="Raavi"/>
-        <a:font script="Cans" typeface="Euphemia"/>
-        <a:font script="Cher" typeface="Plantagenet Cherokee"/>
-        <a:font script="Yiii" typeface="Microsoft Yi Baiti"/>
-        <a:font script="Tibt" typeface="Microsoft Himalaya"/>
-        <a:font script="Thaa" typeface="MV Boli"/>
-        <a:font script="Deva" typeface="Mangal"/>
-        <a:font script="Telu" typeface="Gautami"/>
-        <a:font script="Taml" typeface="Latha"/>
-        <a:font script="Syrc" typeface="Estrangelo Edessa"/>
-        <a:font script="Orya" typeface="Kalinga"/>
-        <a:font script="Mlym" typeface="Kartika"/>
-        <a:font script="Laoo" typeface="DokChampa"/>
-        <a:font script="Sinh" typeface="Iskoola Pota"/>
-        <a:font script="Mong" typeface="Mongolian Baiti"/>
-        <a:font script="Viet" typeface="Times New Roman"/>
-        <a:font script="Uigh" typeface="Microsoft Uighur"/>
-        <a:font script="Geor" typeface="Sylfaen"/>
-      </a:majorFont>
-      <a:minorFont>
-        <a:latin typeface="Arial"/>
-        <a:ea typeface=""/>
-        <a:cs typeface=""/>
-        <a:font script="Jpan" typeface="ＭＳ Ｐゴシック"/>
-        <a:font script="Hang" typeface="맑은 고딕"/>
-        <a:font script="Hans" typeface="宋体"/>
-        <a:font script="Hant" typeface="新細明體"/>
-        <a:font script="Arab" typeface="Arial"/>
-        <a:font script="Hebr" typeface="Arial"/>
-        <a:font script="Thai" typeface="Cordia New"/>
-        <a:font script="Ethi" typeface="Nyala"/>
-        <a:font script="Beng" typeface="Vrinda"/>
-        <a:font script="Gujr" typeface="Shruti"/>
-        <a:font script="Khmr" typeface="DaunPenh"/>
-        <a:font script="Knda" typeface="Tunga"/>
-        <a:font script="Guru" typeface="Raavi"/>
-        <a:font script="Cans" typeface="Euphemia"/>
-        <a:font script="Cher" typeface="Plantagenet Cherokee"/>
-        <a:font script="Yiii" typeface="Microsoft Yi Baiti"/>
-        <a:font script="Tibt" typeface="Microsoft Himalaya"/>
-        <a:font script="Thaa" typeface="MV Boli"/>
-        <a:font script="Deva" typeface="Mangal"/>
-        <a:font script="Telu" typeface="Gautami"/>
-        <a:font script="Taml" typeface="Latha"/>
-        <a:font script="Syrc" typeface="Estrangelo Edessa"/>
-        <a:font script="Orya" typeface="Kalinga"/>
-        <a:font script="Mlym" typeface="Kartika"/>
-        <a:font script="Laoo" typeface="DokChampa"/>
-        <a:font script="Sinh" typeface="Iskoola Pota"/>
-        <a:font script="Mong" typeface="Mongolian Baiti"/>
-        <a:font script="Viet" typeface="Arial"/>
-        <a:font script="Uigh" typeface="Microsoft Uighur"/>
-        <a:font script="Geor" typeface="Sylfaen"/>
-      </a:minorFont>
-    </a:fontScheme>
-    <a:fmtScheme name="Office">
-      <a:fillStyleLst>
-        <a:solidFill>
-          <a:schemeClr val="phClr"/>
-        </a:solidFill>
-        <a:gradFill rotWithShape="1">
-          <a:gsLst>
-            <a:gs pos="0">
-              <a:schemeClr val="phClr">
-                <a:tint val="50000"/>
-                <a:satMod val="300000"/>
-              </a:schemeClr>
-            </a:gs>
-            <a:gs pos="35000">
-              <a:schemeClr val="phClr">
-                <a:tint val="37000"/>
-                <a:satMod val="300000"/>
-              </a:schemeClr>
-            </a:gs>
-            <a:gs pos="100000">
-              <a:schemeClr val="phClr">
-                <a:tint val="15000"/>
-                <a:satMod val="350000"/>
-              </a:schemeClr>
-            </a:gs>
-          </a:gsLst>
-          <a:lin ang="16200000" scaled="1"/>
-        </a:gradFill>
-        <a:gradFill rotWithShape="1">
-          <a:gsLst>
-            <a:gs pos="0">
-              <a:schemeClr val="phClr">
-                <a:tint val="100000"/>
-                <a:shade val="100000"/>
-                <a:satMod val="130000"/>
-              </a:schemeClr>
-            </a:gs>
-            <a:gs pos="100000">
-              <a:schemeClr val="phClr">
-                <a:tint val="50000"/>
-                <a:shade val="100000"/>
-                <a:satMod val="350000"/>
-              </a:schemeClr>
-            </a:gs>
-          </a:gsLst>
-          <a:lin ang="16200000" scaled="0"/>
-        </a:gradFill>
-      </a:fillStyleLst>
-      <a:lnStyleLst>
-        <a:ln w="9525" cap="flat" cmpd="sng" algn="ctr">
-          <a:solidFill>
-            <a:schemeClr val="phClr">
-              <a:shade val="95000"/>
-              <a:satMod val="105000"/>
-            </a:schemeClr>
-          </a:solidFill>
-          <a:prstDash val="solid"/>
-        </a:ln>
-        <a:ln w="25400" cap="flat" cmpd="sng" algn="ctr">
-          <a:solidFill>
-            <a:schemeClr val="phClr"/>
-          </a:solidFill>
-          <a:prstDash val="solid"/>
-        </a:ln>
-        <a:ln w="38100" cap="flat" cmpd="sng" algn="ctr">
-          <a:solidFill>
-            <a:schemeClr val="phClr"/>
-          </a:solidFill>
-          <a:prstDash val="solid"/>
-        </a:ln>
-      </a:lnStyleLst>
-      <a:effectStyleLst>
-        <a:effectStyle>
-          <a:effectLst>
-            <a:outerShdw blurRad="40000" dist="20000" dir="5400000" rotWithShape="0">
-              <a:srgbClr val="000000">
-                <a:alpha val="38000"/>
-              </a:srgbClr>
-            </a:outerShdw>
-          </a:effectLst>
-        </a:effectStyle>
-        <a:effectStyle>
-          <a:effectLst>
-            <a:outerShdw blurRad="40000" dist="23000" dir="5400000" rotWithShape="0">
-              <a:srgbClr val="000000">
-                <a:alpha val="35000"/>
-              </a:srgbClr>
-            </a:outerShdw>
-          </a:effectLst>
-        </a:effectStyle>
-        <a:effectStyle>
-          <a:effectLst>
-            <a:outerShdw blurRad="40000" dist="23000" dir="5400000" rotWithShape="0">
-              <a:srgbClr val="000000">
-                <a:alpha val="35000"/>
-              </a:srgbClr>
-            </a:outerShdw>
-          </a:effectLst>
-          <a:scene3d>
-            <a:camera prst="orthographicFront">
-              <a:rot lat="0" lon="0" rev="0"/>
-            </a:camera>
-            <a:lightRig rig="threePt" dir="t">
-              <a:rot lat="0" lon="0" rev="1200000"/>
-            </a:lightRig>
-          </a:scene3d>
-          <a:sp3d>
-            <a:bevelT w="63500" h="25400"/>
-          </a:sp3d>
-        </a:effectStyle>
-      </a:effectStyleLst>
-      <a:bgFillStyleLst>
-        <a:solidFill>
-          <a:schemeClr val="phClr"/>
-        </a:solidFill>
-        <a:gradFill rotWithShape="1">
-          <a:gsLst>
-            <a:gs pos="0">
-              <a:schemeClr val="phClr">
-                <a:tint val="40000"/>
-                <a:satMod val="350000"/>
-              </a:schemeClr>
-            </a:gs>
-            <a:gs pos="40000">
-              <a:schemeClr val="phClr">
-                <a:tint val="45000"/>
-                <a:shade val="99000"/>
-                <a:satMod val="350000"/>
-              </a:schemeClr>
-            </a:gs>
-            <a:gs pos="100000">
-              <a:schemeClr val="phClr">
-                <a:shade val="20000"/>
-                <a:satMod val="255000"/>
-              </a:schemeClr>
-            </a:gs>
-          </a:gsLst>
-          <a:path path="circle">
-            <a:fillToRect l="50000" t="-80000" r="50000" b="180000"/>
-          </a:path>
-        </a:gradFill>
-        <a:gradFill rotWithShape="1">
-          <a:gsLst>
-            <a:gs pos="0">
-              <a:schemeClr val="phClr">
-                <a:tint val="80000"/>
-                <a:satMod val="300000"/>
-              </a:schemeClr>
-            </a:gs>
-            <a:gs pos="100000">
-              <a:schemeClr val="phClr">
-                <a:shade val="30000"/>
-                <a:satMod val="200000"/>
-              </a:schemeClr>
-            </a:gs>
-          </a:gsLst>
-          <a:path path="circle">
-            <a:fillToRect l="50000" t="50000" r="50000" b="50000"/>
-          </a:path>
-        </a:gradFill>
-      </a:bgFillStyleLst>
-    </a:fmtScheme>
-  </a:themeElements>
-</a:theme>
 </file>
</xml_diff>